<commit_message>
Update Electron Musical Chairs.pptx
Small Updates
</commit_message>
<xml_diff>
--- a/Electron Musical Chairs.pptx
+++ b/Electron Musical Chairs.pptx
@@ -3877,7 +3877,7 @@
           <a:p>
             <a:r>
               <a:rPr lang="en-US" dirty="0"/>
-              <a:t>So in order to paint a picture with photons, we need to understand a description of their nature, the statistical nature</a:t>
+              <a:t>So, in order to paint a picture with photons, we need to understand a description of their nature, the statistical nature</a:t>
             </a:r>
           </a:p>
           <a:p>
@@ -4307,7 +4307,7 @@
           <a:p>
             <a:r>
               <a:rPr lang="en-US" dirty="0"/>
-              <a:t>In particular we will focus on the Quantum Dot </a:t>
+              <a:t>In particular, we will focus on the Quantum Dot </a:t>
             </a:r>
             <a:endParaRPr lang="en-CA" dirty="0"/>
           </a:p>
@@ -7533,15 +7533,6 @@
 </file>
 
 <file path=customXml/item2.xml><?xml version="1.0" encoding="utf-8"?>
-<?mso-contentType ?>
-<FormTemplates xmlns="http://schemas.microsoft.com/sharepoint/v3/contenttype/forms">
-  <Display>DocumentLibraryForm</Display>
-  <Edit>DocumentLibraryForm</Edit>
-  <New>DocumentLibraryForm</New>
-</FormTemplates>
-</file>
-
-<file path=customXml/item3.xml><?xml version="1.0" encoding="utf-8"?>
 <ct:contentTypeSchema xmlns:ct="http://schemas.microsoft.com/office/2006/metadata/contentType" xmlns:ma="http://schemas.microsoft.com/office/2006/metadata/properties/metaAttributes" ct:_="" ma:_="" ma:contentTypeName="Document" ma:contentTypeID="0x01010079F111ED35F8CC479449609E8A0923A6" ma:contentTypeVersion="12" ma:contentTypeDescription="Create a new document." ma:contentTypeScope="" ma:versionID="a410dd7f93c95333ffa1b60ed6adedd1">
   <xsd:schema xmlns:xsd="http://www.w3.org/2001/XMLSchema" xmlns:xs="http://www.w3.org/2001/XMLSchema" xmlns:p="http://schemas.microsoft.com/office/2006/metadata/properties" xmlns:ns2="71af3243-3dd4-4a8d-8c0d-dd76da1f02a5" xmlns:ns3="16c05727-aa75-4e4a-9b5f-8a80a1165891" targetNamespace="http://schemas.microsoft.com/office/2006/metadata/properties" ma:root="true" ma:fieldsID="a936d9baba76aa3866493feff160faab" ns2:_="" ns3:_="">
     <xsd:import namespace="71af3243-3dd4-4a8d-8c0d-dd76da1f02a5"/>
@@ -7762,6 +7753,15 @@
 </ct:contentTypeSchema>
 </file>
 
+<file path=customXml/item3.xml><?xml version="1.0" encoding="utf-8"?>
+<?mso-contentType ?>
+<FormTemplates xmlns="http://schemas.microsoft.com/sharepoint/v3/contenttype/forms">
+  <Display>DocumentLibraryForm</Display>
+  <Edit>DocumentLibraryForm</Edit>
+  <New>DocumentLibraryForm</New>
+</FormTemplates>
+</file>
+
 <file path=customXml/itemProps1.xml><?xml version="1.0" encoding="utf-8"?>
 <ds:datastoreItem xmlns:ds="http://schemas.openxmlformats.org/officeDocument/2006/customXml" ds:itemID="{A03EEFF0-FB57-4CB4-8BFC-DF397689E2ED}">
   <ds:schemaRefs>
@@ -7773,14 +7773,6 @@
 </file>
 
 <file path=customXml/itemProps2.xml><?xml version="1.0" encoding="utf-8"?>
-<ds:datastoreItem xmlns:ds="http://schemas.openxmlformats.org/officeDocument/2006/customXml" ds:itemID="{AA3F7EDC-E5B4-4BBC-9D2A-CBE6D46C37AD}">
-  <ds:schemaRefs>
-    <ds:schemaRef ds:uri="http://schemas.microsoft.com/sharepoint/v3/contenttype/forms"/>
-  </ds:schemaRefs>
-</ds:datastoreItem>
-</file>
-
-<file path=customXml/itemProps3.xml><?xml version="1.0" encoding="utf-8"?>
 <ds:datastoreItem xmlns:ds="http://schemas.openxmlformats.org/officeDocument/2006/customXml" ds:itemID="{93932EF5-314F-409E-8020-FEE5FA0795B9}">
   <ds:schemaRefs>
     <ds:schemaRef ds:uri="http://schemas.microsoft.com/office/2006/metadata/contentType"/>
@@ -7797,4 +7789,12 @@
     <ds:schemaRef ds:uri="http://schemas.microsoft.com/internal/obd"/>
   </ds:schemaRefs>
 </ds:datastoreItem>
+</file>
+
+<file path=customXml/itemProps3.xml><?xml version="1.0" encoding="utf-8"?>
+<ds:datastoreItem xmlns:ds="http://schemas.openxmlformats.org/officeDocument/2006/customXml" ds:itemID="{AA3F7EDC-E5B4-4BBC-9D2A-CBE6D46C37AD}">
+  <ds:schemaRefs>
+    <ds:schemaRef ds:uri="http://schemas.microsoft.com/sharepoint/v3/contenttype/forms"/>
+  </ds:schemaRefs>
+</ds:datastoreItem>
 </file>
</xml_diff>